<commit_message>
add ANOVA TEST for freature selection
</commit_message>
<xml_diff>
--- a/Presentation/Feature Selection.pptx
+++ b/Presentation/Feature Selection.pptx
@@ -62,6 +62,12 @@
     <p:sldId id="318" r:id="rId56"/>
     <p:sldId id="322" r:id="rId57"/>
     <p:sldId id="320" r:id="rId58"/>
+    <p:sldId id="328" r:id="rId59"/>
+    <p:sldId id="325" r:id="rId60"/>
+    <p:sldId id="326" r:id="rId61"/>
+    <p:sldId id="327" r:id="rId62"/>
+    <p:sldId id="329" r:id="rId63"/>
+    <p:sldId id="330" r:id="rId64"/>
   </p:sldIdLst>
   <p:sldSz cx="12192000" cy="6858000"/>
   <p:notesSz cx="6858000" cy="9144000"/>
@@ -326,7 +332,7 @@
           <a:p>
             <a:fld id="{D5FA70A3-A6FF-4EAA-B623-AB4CFD6C9082}" type="datetimeFigureOut">
               <a:rPr lang="he-IL" smtClean="0"/>
-              <a:t>ט"ו/ניסן/תש"פ</a:t>
+              <a:t>ט"ז/ניסן/תש"פ</a:t>
             </a:fld>
             <a:endParaRPr lang="he-IL"/>
           </a:p>
@@ -524,7 +530,7 @@
           <a:p>
             <a:fld id="{D5FA70A3-A6FF-4EAA-B623-AB4CFD6C9082}" type="datetimeFigureOut">
               <a:rPr lang="he-IL" smtClean="0"/>
-              <a:t>ט"ו/ניסן/תש"פ</a:t>
+              <a:t>ט"ז/ניסן/תש"פ</a:t>
             </a:fld>
             <a:endParaRPr lang="he-IL"/>
           </a:p>
@@ -732,7 +738,7 @@
           <a:p>
             <a:fld id="{D5FA70A3-A6FF-4EAA-B623-AB4CFD6C9082}" type="datetimeFigureOut">
               <a:rPr lang="he-IL" smtClean="0"/>
-              <a:t>ט"ו/ניסן/תש"פ</a:t>
+              <a:t>ט"ז/ניסן/תש"פ</a:t>
             </a:fld>
             <a:endParaRPr lang="he-IL"/>
           </a:p>
@@ -930,7 +936,7 @@
           <a:p>
             <a:fld id="{D5FA70A3-A6FF-4EAA-B623-AB4CFD6C9082}" type="datetimeFigureOut">
               <a:rPr lang="he-IL" smtClean="0"/>
-              <a:t>ט"ו/ניסן/תש"פ</a:t>
+              <a:t>ט"ז/ניסן/תש"פ</a:t>
             </a:fld>
             <a:endParaRPr lang="he-IL"/>
           </a:p>
@@ -1205,7 +1211,7 @@
           <a:p>
             <a:fld id="{D5FA70A3-A6FF-4EAA-B623-AB4CFD6C9082}" type="datetimeFigureOut">
               <a:rPr lang="he-IL" smtClean="0"/>
-              <a:t>ט"ו/ניסן/תש"פ</a:t>
+              <a:t>ט"ז/ניסן/תש"פ</a:t>
             </a:fld>
             <a:endParaRPr lang="he-IL"/>
           </a:p>
@@ -1470,7 +1476,7 @@
           <a:p>
             <a:fld id="{D5FA70A3-A6FF-4EAA-B623-AB4CFD6C9082}" type="datetimeFigureOut">
               <a:rPr lang="he-IL" smtClean="0"/>
-              <a:t>ט"ו/ניסן/תש"פ</a:t>
+              <a:t>ט"ז/ניסן/תש"פ</a:t>
             </a:fld>
             <a:endParaRPr lang="he-IL"/>
           </a:p>
@@ -1882,7 +1888,7 @@
           <a:p>
             <a:fld id="{D5FA70A3-A6FF-4EAA-B623-AB4CFD6C9082}" type="datetimeFigureOut">
               <a:rPr lang="he-IL" smtClean="0"/>
-              <a:t>ט"ו/ניסן/תש"פ</a:t>
+              <a:t>ט"ז/ניסן/תש"פ</a:t>
             </a:fld>
             <a:endParaRPr lang="he-IL"/>
           </a:p>
@@ -2023,7 +2029,7 @@
           <a:p>
             <a:fld id="{D5FA70A3-A6FF-4EAA-B623-AB4CFD6C9082}" type="datetimeFigureOut">
               <a:rPr lang="he-IL" smtClean="0"/>
-              <a:t>ט"ו/ניסן/תש"פ</a:t>
+              <a:t>ט"ז/ניסן/תש"פ</a:t>
             </a:fld>
             <a:endParaRPr lang="he-IL"/>
           </a:p>
@@ -2136,7 +2142,7 @@
           <a:p>
             <a:fld id="{D5FA70A3-A6FF-4EAA-B623-AB4CFD6C9082}" type="datetimeFigureOut">
               <a:rPr lang="he-IL" smtClean="0"/>
-              <a:t>ט"ו/ניסן/תש"פ</a:t>
+              <a:t>ט"ז/ניסן/תש"פ</a:t>
             </a:fld>
             <a:endParaRPr lang="he-IL"/>
           </a:p>
@@ -2447,7 +2453,7 @@
           <a:p>
             <a:fld id="{D5FA70A3-A6FF-4EAA-B623-AB4CFD6C9082}" type="datetimeFigureOut">
               <a:rPr lang="he-IL" smtClean="0"/>
-              <a:t>ט"ו/ניסן/תש"פ</a:t>
+              <a:t>ט"ז/ניסן/תש"פ</a:t>
             </a:fld>
             <a:endParaRPr lang="he-IL"/>
           </a:p>
@@ -2735,7 +2741,7 @@
           <a:p>
             <a:fld id="{D5FA70A3-A6FF-4EAA-B623-AB4CFD6C9082}" type="datetimeFigureOut">
               <a:rPr lang="he-IL" smtClean="0"/>
-              <a:t>ט"ו/ניסן/תש"פ</a:t>
+              <a:t>ט"ז/ניסן/תש"פ</a:t>
             </a:fld>
             <a:endParaRPr lang="he-IL"/>
           </a:p>
@@ -2976,7 +2982,7 @@
           <a:p>
             <a:fld id="{D5FA70A3-A6FF-4EAA-B623-AB4CFD6C9082}" type="datetimeFigureOut">
               <a:rPr lang="he-IL" smtClean="0"/>
-              <a:t>ט"ו/ניסן/תש"פ</a:t>
+              <a:t>ט"ז/ניסן/תש"פ</a:t>
             </a:fld>
             <a:endParaRPr lang="he-IL"/>
           </a:p>
@@ -13365,6 +13371,343 @@
 </p:sld>
 </file>
 
+<file path=ppt/slides/slide58.xml><?xml version="1.0" encoding="utf-8"?>
+<p:sld xmlns:a="http://schemas.openxmlformats.org/drawingml/2006/main" xmlns:r="http://schemas.openxmlformats.org/officeDocument/2006/relationships" xmlns:p="http://schemas.openxmlformats.org/presentationml/2006/main">
+  <p:cSld>
+    <p:spTree>
+      <p:nvGrpSpPr>
+        <p:cNvPr id="1" name=""/>
+        <p:cNvGrpSpPr/>
+        <p:nvPr/>
+      </p:nvGrpSpPr>
+      <p:grpSpPr>
+        <a:xfrm>
+          <a:off x="0" y="0"/>
+          <a:ext cx="0" cy="0"/>
+          <a:chOff x="0" y="0"/>
+          <a:chExt cx="0" cy="0"/>
+        </a:xfrm>
+      </p:grpSpPr>
+      <p:sp>
+        <p:nvSpPr>
+          <p:cNvPr id="2" name="כותרת 1">
+            <a:extLst>
+              <a:ext uri="{FF2B5EF4-FFF2-40B4-BE49-F238E27FC236}">
+                <a16:creationId xmlns:a16="http://schemas.microsoft.com/office/drawing/2014/main" id="{007A278D-FE67-4F2B-AB85-CEA6D7E415AF}"/>
+              </a:ext>
+            </a:extLst>
+          </p:cNvPr>
+          <p:cNvSpPr>
+            <a:spLocks noGrp="1"/>
+          </p:cNvSpPr>
+          <p:nvPr>
+            <p:ph type="title"/>
+          </p:nvPr>
+        </p:nvSpPr>
+        <p:spPr/>
+        <p:txBody>
+          <a:bodyPr/>
+          <a:lstStyle/>
+          <a:p>
+            <a:endParaRPr lang="he-IL" dirty="0"/>
+          </a:p>
+        </p:txBody>
+      </p:sp>
+      <p:sp>
+        <p:nvSpPr>
+          <p:cNvPr id="3" name="מציין מיקום תוכן 2">
+            <a:extLst>
+              <a:ext uri="{FF2B5EF4-FFF2-40B4-BE49-F238E27FC236}">
+                <a16:creationId xmlns:a16="http://schemas.microsoft.com/office/drawing/2014/main" id="{6D40306E-51AD-4D44-A81A-9B06880E92BA}"/>
+              </a:ext>
+            </a:extLst>
+          </p:cNvPr>
+          <p:cNvSpPr>
+            <a:spLocks noGrp="1"/>
+          </p:cNvSpPr>
+          <p:nvPr>
+            <p:ph idx="1"/>
+          </p:nvPr>
+        </p:nvSpPr>
+        <p:spPr/>
+        <p:txBody>
+          <a:bodyPr>
+            <a:normAutofit fontScale="92500" lnSpcReduction="10000"/>
+          </a:bodyPr>
+          <a:lstStyle/>
+          <a:p>
+            <a:pPr marL="0" indent="0" algn="ctr">
+              <a:buNone/>
+            </a:pPr>
+            <a:r>
+              <a:rPr lang="en-US" sz="12000" dirty="0"/>
+              <a:t>ANOVA TEST</a:t>
+            </a:r>
+            <a:endParaRPr lang="he-IL" sz="12000" dirty="0"/>
+          </a:p>
+          <a:p>
+            <a:pPr marL="0" indent="0" algn="ctr">
+              <a:buNone/>
+            </a:pPr>
+            <a:r>
+              <a:rPr lang="he-IL" sz="12000" dirty="0"/>
+              <a:t>ב </a:t>
+            </a:r>
+            <a:r>
+              <a:rPr lang="en-US" sz="12000" dirty="0"/>
+              <a:t>Feature Selection</a:t>
+            </a:r>
+            <a:endParaRPr lang="he-IL" sz="12000" dirty="0"/>
+          </a:p>
+          <a:p>
+            <a:pPr marL="0" indent="0" algn="ctr">
+              <a:buNone/>
+            </a:pPr>
+            <a:endParaRPr lang="he-IL" sz="12000" dirty="0"/>
+          </a:p>
+        </p:txBody>
+      </p:sp>
+    </p:spTree>
+    <p:extLst>
+      <p:ext uri="{BB962C8B-B14F-4D97-AF65-F5344CB8AC3E}">
+        <p14:creationId xmlns:p14="http://schemas.microsoft.com/office/powerpoint/2010/main" val="2987798756"/>
+      </p:ext>
+    </p:extLst>
+  </p:cSld>
+  <p:clrMapOvr>
+    <a:masterClrMapping/>
+  </p:clrMapOvr>
+</p:sld>
+</file>
+
+<file path=ppt/slides/slide59.xml><?xml version="1.0" encoding="utf-8"?>
+<p:sld xmlns:a="http://schemas.openxmlformats.org/drawingml/2006/main" xmlns:r="http://schemas.openxmlformats.org/officeDocument/2006/relationships" xmlns:p="http://schemas.openxmlformats.org/presentationml/2006/main">
+  <p:cSld>
+    <p:spTree>
+      <p:nvGrpSpPr>
+        <p:cNvPr id="1" name=""/>
+        <p:cNvGrpSpPr/>
+        <p:nvPr/>
+      </p:nvGrpSpPr>
+      <p:grpSpPr>
+        <a:xfrm>
+          <a:off x="0" y="0"/>
+          <a:ext cx="0" cy="0"/>
+          <a:chOff x="0" y="0"/>
+          <a:chExt cx="0" cy="0"/>
+        </a:xfrm>
+      </p:grpSpPr>
+      <p:sp>
+        <p:nvSpPr>
+          <p:cNvPr id="2" name="כותרת 1">
+            <a:extLst>
+              <a:ext uri="{FF2B5EF4-FFF2-40B4-BE49-F238E27FC236}">
+                <a16:creationId xmlns:a16="http://schemas.microsoft.com/office/drawing/2014/main" id="{3B9BFF28-620A-4E41-912C-3BE07EE570AD}"/>
+              </a:ext>
+            </a:extLst>
+          </p:cNvPr>
+          <p:cNvSpPr>
+            <a:spLocks noGrp="1"/>
+          </p:cNvSpPr>
+          <p:nvPr>
+            <p:ph type="title"/>
+          </p:nvPr>
+        </p:nvSpPr>
+        <p:spPr>
+          <a:xfrm>
+            <a:off x="838200" y="365125"/>
+            <a:ext cx="11093388" cy="1325563"/>
+          </a:xfrm>
+        </p:spPr>
+        <p:txBody>
+          <a:bodyPr/>
+          <a:lstStyle/>
+          <a:p>
+            <a:r>
+              <a:rPr lang="he-IL" dirty="0"/>
+              <a:t>שימוש במבחן </a:t>
+            </a:r>
+            <a:r>
+              <a:rPr lang="en-US" dirty="0"/>
+              <a:t>ANOVA</a:t>
+            </a:r>
+            <a:r>
+              <a:rPr lang="he-IL" dirty="0"/>
+              <a:t> לטובת </a:t>
+            </a:r>
+            <a:r>
+              <a:rPr lang="en-US" dirty="0"/>
+              <a:t>Feature Selection</a:t>
+            </a:r>
+            <a:r>
+              <a:rPr lang="he-IL" dirty="0"/>
+              <a:t> – 1</a:t>
+            </a:r>
+          </a:p>
+        </p:txBody>
+      </p:sp>
+      <p:sp>
+        <p:nvSpPr>
+          <p:cNvPr id="3" name="מציין מיקום תוכן 2">
+            <a:extLst>
+              <a:ext uri="{FF2B5EF4-FFF2-40B4-BE49-F238E27FC236}">
+                <a16:creationId xmlns:a16="http://schemas.microsoft.com/office/drawing/2014/main" id="{38B7CD09-9088-4B59-A14D-10DD3A880F0D}"/>
+              </a:ext>
+            </a:extLst>
+          </p:cNvPr>
+          <p:cNvSpPr>
+            <a:spLocks noGrp="1"/>
+          </p:cNvSpPr>
+          <p:nvPr>
+            <p:ph idx="1"/>
+          </p:nvPr>
+        </p:nvSpPr>
+        <p:spPr>
+          <a:xfrm>
+            <a:off x="838200" y="1825625"/>
+            <a:ext cx="11093388" cy="4351338"/>
+          </a:xfrm>
+        </p:spPr>
+        <p:txBody>
+          <a:bodyPr>
+            <a:normAutofit fontScale="92500" lnSpcReduction="10000"/>
+          </a:bodyPr>
+          <a:lstStyle/>
+          <a:p>
+            <a:r>
+              <a:rPr lang="he-IL" dirty="0"/>
+              <a:t>תזכורת:</a:t>
+            </a:r>
+          </a:p>
+          <a:p>
+            <a:pPr lvl="1"/>
+            <a:r>
+              <a:rPr lang="en-US" dirty="0"/>
+              <a:t>NULL Hypothesis</a:t>
+            </a:r>
+            <a:r>
+              <a:rPr lang="he-IL" dirty="0"/>
+              <a:t>, השערת האפס – אין הבדל בין 2 (או יותר) תצפיות / דגימות.</a:t>
+            </a:r>
+          </a:p>
+          <a:p>
+            <a:pPr lvl="2"/>
+            <a:r>
+              <a:rPr lang="he-IL" dirty="0"/>
+              <a:t>כלומר דגימות הללו לא מספקות מספיק מידע.</a:t>
+            </a:r>
+          </a:p>
+          <a:p>
+            <a:pPr lvl="1"/>
+            <a:r>
+              <a:rPr lang="en-US" dirty="0"/>
+              <a:t>Critical Value</a:t>
+            </a:r>
+            <a:r>
+              <a:rPr lang="he-IL" dirty="0"/>
+              <a:t>, ערך, סף שממנו מחליטים האם מקבלים או דוחים את השערת האפס</a:t>
+            </a:r>
+          </a:p>
+          <a:p>
+            <a:pPr lvl="1"/>
+            <a:r>
+              <a:rPr lang="en-US" dirty="0"/>
+              <a:t>Grand mean</a:t>
+            </a:r>
+            <a:r>
+              <a:rPr lang="he-IL" dirty="0"/>
+              <a:t> – ממוצע הממוצעים (מחשבים ממוצע בכל קבוצה של קטגוריה ואז מחשבים את הממוצע בין הקבוצות)</a:t>
+            </a:r>
+          </a:p>
+          <a:p>
+            <a:r>
+              <a:rPr lang="he-IL" dirty="0"/>
+              <a:t>מספר סוגים למבחן </a:t>
+            </a:r>
+            <a:r>
+              <a:rPr lang="en-US" dirty="0"/>
+              <a:t>ANOVA</a:t>
+            </a:r>
+            <a:r>
+              <a:rPr lang="he-IL" dirty="0"/>
+              <a:t>:</a:t>
+            </a:r>
+          </a:p>
+          <a:p>
+            <a:pPr lvl="1"/>
+            <a:r>
+              <a:rPr lang="en-US" dirty="0"/>
+              <a:t>One way ANOVA</a:t>
+            </a:r>
+            <a:r>
+              <a:rPr lang="he-IL" dirty="0"/>
+              <a:t> – בחינה בין לפחות 3 קבוצות האם משפיעות על משתנה (או שהוא בלתי תלוי בהם)</a:t>
+            </a:r>
+          </a:p>
+          <a:p>
+            <a:pPr lvl="1"/>
+            <a:r>
+              <a:rPr lang="en-US" dirty="0"/>
+              <a:t>MANOVA</a:t>
+            </a:r>
+            <a:endParaRPr lang="he-IL" dirty="0"/>
+          </a:p>
+          <a:p>
+            <a:r>
+              <a:rPr lang="en-US" dirty="0"/>
+              <a:t>SD (Standard Deviation) = sqrt(Variance)</a:t>
+            </a:r>
+            <a:endParaRPr lang="he-IL" dirty="0"/>
+          </a:p>
+          <a:p>
+            <a:r>
+              <a:rPr lang="he-IL" dirty="0"/>
+              <a:t>ב  </a:t>
+            </a:r>
+            <a:r>
+              <a:rPr lang="en-US" dirty="0"/>
+              <a:t>Feature selection</a:t>
+            </a:r>
+            <a:r>
+              <a:rPr lang="he-IL" dirty="0"/>
+              <a:t> אנו רוצים ש </a:t>
+            </a:r>
+            <a:r>
+              <a:rPr lang="en-US" dirty="0"/>
+              <a:t>Xi</a:t>
+            </a:r>
+            <a:r>
+              <a:rPr lang="he-IL" dirty="0"/>
+              <a:t> יהיה תלוי ב </a:t>
+            </a:r>
+            <a:r>
+              <a:rPr lang="en-US" dirty="0"/>
+              <a:t>Y</a:t>
+            </a:r>
+            <a:r>
+              <a:rPr lang="he-IL" dirty="0"/>
+              <a:t>.</a:t>
+            </a:r>
+          </a:p>
+          <a:p>
+            <a:pPr lvl="1"/>
+            <a:endParaRPr lang="en-US" dirty="0"/>
+          </a:p>
+        </p:txBody>
+      </p:sp>
+    </p:spTree>
+    <p:extLst>
+      <p:ext uri="{BB962C8B-B14F-4D97-AF65-F5344CB8AC3E}">
+        <p14:creationId xmlns:p14="http://schemas.microsoft.com/office/powerpoint/2010/main" val="3792780757"/>
+      </p:ext>
+    </p:extLst>
+  </p:cSld>
+  <p:clrMapOvr>
+    <a:masterClrMapping/>
+  </p:clrMapOvr>
+</p:sld>
+</file>
+
 <file path=ppt/slides/slide6.xml><?xml version="1.0" encoding="utf-8"?>
 <p:sld xmlns:a="http://schemas.openxmlformats.org/drawingml/2006/main" xmlns:r="http://schemas.openxmlformats.org/officeDocument/2006/relationships" xmlns:p="http://schemas.openxmlformats.org/presentationml/2006/main">
   <p:cSld>
@@ -13620,6 +13963,871 @@
     <p:extLst>
       <p:ext uri="{BB962C8B-B14F-4D97-AF65-F5344CB8AC3E}">
         <p14:creationId xmlns:p14="http://schemas.microsoft.com/office/powerpoint/2010/main" val="3050118887"/>
+      </p:ext>
+    </p:extLst>
+  </p:cSld>
+  <p:clrMapOvr>
+    <a:masterClrMapping/>
+  </p:clrMapOvr>
+</p:sld>
+</file>
+
+<file path=ppt/slides/slide60.xml><?xml version="1.0" encoding="utf-8"?>
+<p:sld xmlns:a="http://schemas.openxmlformats.org/drawingml/2006/main" xmlns:r="http://schemas.openxmlformats.org/officeDocument/2006/relationships" xmlns:p="http://schemas.openxmlformats.org/presentationml/2006/main">
+  <p:cSld>
+    <p:spTree>
+      <p:nvGrpSpPr>
+        <p:cNvPr id="1" name=""/>
+        <p:cNvGrpSpPr/>
+        <p:nvPr/>
+      </p:nvGrpSpPr>
+      <p:grpSpPr>
+        <a:xfrm>
+          <a:off x="0" y="0"/>
+          <a:ext cx="0" cy="0"/>
+          <a:chOff x="0" y="0"/>
+          <a:chExt cx="0" cy="0"/>
+        </a:xfrm>
+      </p:grpSpPr>
+      <p:sp>
+        <p:nvSpPr>
+          <p:cNvPr id="2" name="כותרת 1">
+            <a:extLst>
+              <a:ext uri="{FF2B5EF4-FFF2-40B4-BE49-F238E27FC236}">
+                <a16:creationId xmlns:a16="http://schemas.microsoft.com/office/drawing/2014/main" id="{3B9BFF28-620A-4E41-912C-3BE07EE570AD}"/>
+              </a:ext>
+            </a:extLst>
+          </p:cNvPr>
+          <p:cNvSpPr>
+            <a:spLocks noGrp="1"/>
+          </p:cNvSpPr>
+          <p:nvPr>
+            <p:ph type="title"/>
+          </p:nvPr>
+        </p:nvSpPr>
+        <p:spPr>
+          <a:xfrm>
+            <a:off x="838200" y="365125"/>
+            <a:ext cx="11093388" cy="1325563"/>
+          </a:xfrm>
+        </p:spPr>
+        <p:txBody>
+          <a:bodyPr/>
+          <a:lstStyle/>
+          <a:p>
+            <a:r>
+              <a:rPr lang="he-IL" dirty="0"/>
+              <a:t>שימוש במבחן </a:t>
+            </a:r>
+            <a:r>
+              <a:rPr lang="en-US" dirty="0"/>
+              <a:t>ANOVA</a:t>
+            </a:r>
+            <a:r>
+              <a:rPr lang="he-IL" dirty="0"/>
+              <a:t> לטובת </a:t>
+            </a:r>
+            <a:r>
+              <a:rPr lang="en-US" dirty="0"/>
+              <a:t>Feature Selection</a:t>
+            </a:r>
+            <a:r>
+              <a:rPr lang="he-IL" dirty="0"/>
+              <a:t> – 2</a:t>
+            </a:r>
+          </a:p>
+        </p:txBody>
+      </p:sp>
+      <p:sp>
+        <p:nvSpPr>
+          <p:cNvPr id="3" name="מציין מיקום תוכן 2">
+            <a:extLst>
+              <a:ext uri="{FF2B5EF4-FFF2-40B4-BE49-F238E27FC236}">
+                <a16:creationId xmlns:a16="http://schemas.microsoft.com/office/drawing/2014/main" id="{38B7CD09-9088-4B59-A14D-10DD3A880F0D}"/>
+              </a:ext>
+            </a:extLst>
+          </p:cNvPr>
+          <p:cNvSpPr>
+            <a:spLocks noGrp="1"/>
+          </p:cNvSpPr>
+          <p:nvPr>
+            <p:ph idx="1"/>
+          </p:nvPr>
+        </p:nvSpPr>
+        <p:spPr>
+          <a:xfrm>
+            <a:off x="838200" y="1825625"/>
+            <a:ext cx="11093388" cy="4351338"/>
+          </a:xfrm>
+        </p:spPr>
+        <p:txBody>
+          <a:bodyPr>
+            <a:normAutofit fontScale="70000" lnSpcReduction="20000"/>
+          </a:bodyPr>
+          <a:lstStyle/>
+          <a:p>
+            <a:r>
+              <a:rPr lang="en-US" dirty="0"/>
+              <a:t>ANOVA</a:t>
+            </a:r>
+            <a:r>
+              <a:rPr lang="he-IL" dirty="0"/>
+              <a:t> = </a:t>
+            </a:r>
+            <a:r>
+              <a:rPr lang="en-US" dirty="0"/>
+              <a:t>Analysis Variance</a:t>
+            </a:r>
+            <a:endParaRPr lang="he-IL" dirty="0"/>
+          </a:p>
+          <a:p>
+            <a:r>
+              <a:rPr lang="he-IL" dirty="0"/>
+              <a:t>מבחן הבודק את הקשר/יחס בין </a:t>
+            </a:r>
+            <a:r>
+              <a:rPr lang="en-US" dirty="0"/>
+              <a:t>feature</a:t>
+            </a:r>
+            <a:r>
+              <a:rPr lang="he-IL" dirty="0"/>
+              <a:t> מסוג קטגוריה לבין משתנה רציף</a:t>
+            </a:r>
+          </a:p>
+          <a:p>
+            <a:pPr lvl="1"/>
+            <a:r>
+              <a:rPr lang="he-IL" dirty="0"/>
+              <a:t>אם אותה שונות בין הקבוצות =&gt; לא ניתן להסיק שיש תלות בין ה </a:t>
+            </a:r>
+            <a:r>
+              <a:rPr lang="en-US" dirty="0"/>
+              <a:t>feature</a:t>
+            </a:r>
+            <a:r>
+              <a:rPr lang="he-IL" dirty="0"/>
+              <a:t> ל </a:t>
+            </a:r>
+            <a:r>
+              <a:rPr lang="en-US" dirty="0"/>
+              <a:t>Y</a:t>
+            </a:r>
+            <a:r>
+              <a:rPr lang="he-IL" dirty="0"/>
+              <a:t> =&gt; לא נכלול </a:t>
+            </a:r>
+            <a:r>
+              <a:rPr lang="en-US" dirty="0"/>
+              <a:t>feature</a:t>
+            </a:r>
+            <a:r>
+              <a:rPr lang="he-IL" dirty="0"/>
+              <a:t> זה</a:t>
+            </a:r>
+          </a:p>
+          <a:p>
+            <a:r>
+              <a:rPr lang="he-IL" dirty="0"/>
+              <a:t>מבחן הנועד במקרה ש:</a:t>
+            </a:r>
+          </a:p>
+          <a:p>
+            <a:pPr lvl="1"/>
+            <a:r>
+              <a:rPr lang="he-IL" dirty="0"/>
+              <a:t> </a:t>
+            </a:r>
+            <a:r>
+              <a:rPr lang="en-US" dirty="0"/>
+              <a:t>Y</a:t>
+            </a:r>
+            <a:r>
+              <a:rPr lang="he-IL" dirty="0"/>
+              <a:t> רציף (נניח ציון מבחן)</a:t>
+            </a:r>
+          </a:p>
+          <a:p>
+            <a:pPr lvl="1"/>
+            <a:r>
+              <a:rPr lang="en-US" dirty="0"/>
+              <a:t>Xi</a:t>
+            </a:r>
+            <a:r>
+              <a:rPr lang="he-IL" dirty="0"/>
+              <a:t> מסוג קטגוריה (נניח אפוטרופוס </a:t>
+            </a:r>
+            <a:r>
+              <a:rPr lang="en-US" dirty="0"/>
+              <a:t>guardian</a:t>
+            </a:r>
+            <a:r>
+              <a:rPr lang="he-IL" dirty="0"/>
+              <a:t>) (אבא/אמא/אחר)</a:t>
+            </a:r>
+          </a:p>
+          <a:p>
+            <a:r>
+              <a:rPr lang="he-IL" dirty="0"/>
+              <a:t>אם השונות נמוכה =&gt; המשתנה (</a:t>
+            </a:r>
+            <a:r>
+              <a:rPr lang="en-US" dirty="0"/>
+              <a:t>feature</a:t>
+            </a:r>
+            <a:r>
+              <a:rPr lang="he-IL" dirty="0"/>
+              <a:t>) כמעט ולא משפיע על </a:t>
+            </a:r>
+            <a:r>
+              <a:rPr lang="en-US" dirty="0"/>
+              <a:t>Y</a:t>
+            </a:r>
+            <a:endParaRPr lang="he-IL" dirty="0"/>
+          </a:p>
+          <a:p>
+            <a:pPr lvl="1"/>
+            <a:r>
+              <a:rPr lang="he-IL" dirty="0"/>
+              <a:t>כי אין ממש שינוי ב </a:t>
+            </a:r>
+            <a:r>
+              <a:rPr lang="en-US" dirty="0"/>
+              <a:t>Xi</a:t>
+            </a:r>
+            <a:r>
+              <a:rPr lang="he-IL" dirty="0"/>
+              <a:t> בערכיו אז לא ניתן להסיק שינוי ב </a:t>
+            </a:r>
+            <a:r>
+              <a:rPr lang="en-US" dirty="0"/>
+              <a:t>X</a:t>
+            </a:r>
+            <a:r>
+              <a:rPr lang="he-IL" dirty="0"/>
+              <a:t> עם השפעה על </a:t>
+            </a:r>
+            <a:r>
+              <a:rPr lang="en-US" dirty="0"/>
+              <a:t>Y</a:t>
+            </a:r>
+            <a:endParaRPr lang="he-IL" dirty="0"/>
+          </a:p>
+          <a:p>
+            <a:r>
+              <a:rPr lang="he-IL" dirty="0"/>
+              <a:t>מבחן </a:t>
+            </a:r>
+            <a:r>
+              <a:rPr lang="en-US" dirty="0"/>
+              <a:t>ANOVA</a:t>
+            </a:r>
+            <a:r>
+              <a:rPr lang="he-IL" dirty="0"/>
+              <a:t> בודק שה </a:t>
+            </a:r>
+            <a:r>
+              <a:rPr lang="en-US" dirty="0"/>
+              <a:t>mean</a:t>
+            </a:r>
+            <a:r>
+              <a:rPr lang="he-IL" dirty="0"/>
+              <a:t> שכל הקבוצות שוות.</a:t>
+            </a:r>
+          </a:p>
+          <a:p>
+            <a:r>
+              <a:rPr lang="en-US" dirty="0"/>
+              <a:t>DF = Degree Freedom</a:t>
+            </a:r>
+            <a:endParaRPr lang="he-IL" dirty="0"/>
+          </a:p>
+          <a:p>
+            <a:pPr lvl="1"/>
+            <a:r>
+              <a:rPr lang="he-IL" dirty="0"/>
+              <a:t>מספר דרגות חופש</a:t>
+            </a:r>
+          </a:p>
+          <a:p>
+            <a:pPr lvl="1"/>
+            <a:r>
+              <a:rPr lang="en-US" dirty="0"/>
+              <a:t>DF1</a:t>
+            </a:r>
+            <a:r>
+              <a:rPr lang="he-IL" dirty="0"/>
+              <a:t> – מספר דרגות חופש בתוך קבוצה</a:t>
+            </a:r>
+          </a:p>
+          <a:p>
+            <a:pPr lvl="1"/>
+            <a:r>
+              <a:rPr lang="en-US" dirty="0"/>
+              <a:t>DF2</a:t>
+            </a:r>
+            <a:r>
+              <a:rPr lang="he-IL" dirty="0"/>
+              <a:t> – מספר דרגות חופש בין דגימה בקבוצה לבין שאר הקבוצות</a:t>
+            </a:r>
+          </a:p>
+          <a:p>
+            <a:r>
+              <a:rPr lang="en-US" dirty="0"/>
+              <a:t>F-TABLE</a:t>
+            </a:r>
+            <a:endParaRPr lang="he-IL" dirty="0"/>
+          </a:p>
+          <a:p>
+            <a:pPr lvl="1"/>
+            <a:r>
+              <a:rPr lang="he-IL" dirty="0"/>
+              <a:t>טבלה (נתונה מהרשת) עם שורות/עמודות שהם </a:t>
+            </a:r>
+            <a:r>
+              <a:rPr lang="en-US" dirty="0"/>
+              <a:t>DF1/2</a:t>
+            </a:r>
+            <a:r>
+              <a:rPr lang="he-IL" dirty="0"/>
+              <a:t> וערך תוצאה </a:t>
+            </a:r>
+            <a:r>
+              <a:rPr lang="en-US" dirty="0"/>
+              <a:t>F</a:t>
+            </a:r>
+            <a:endParaRPr lang="he-IL" dirty="0"/>
+          </a:p>
+          <a:p>
+            <a:endParaRPr lang="en-US" dirty="0"/>
+          </a:p>
+        </p:txBody>
+      </p:sp>
+    </p:spTree>
+    <p:extLst>
+      <p:ext uri="{BB962C8B-B14F-4D97-AF65-F5344CB8AC3E}">
+        <p14:creationId xmlns:p14="http://schemas.microsoft.com/office/powerpoint/2010/main" val="776877499"/>
+      </p:ext>
+    </p:extLst>
+  </p:cSld>
+  <p:clrMapOvr>
+    <a:masterClrMapping/>
+  </p:clrMapOvr>
+</p:sld>
+</file>
+
+<file path=ppt/slides/slide61.xml><?xml version="1.0" encoding="utf-8"?>
+<p:sld xmlns:a="http://schemas.openxmlformats.org/drawingml/2006/main" xmlns:r="http://schemas.openxmlformats.org/officeDocument/2006/relationships" xmlns:p="http://schemas.openxmlformats.org/presentationml/2006/main">
+  <p:cSld>
+    <p:spTree>
+      <p:nvGrpSpPr>
+        <p:cNvPr id="1" name=""/>
+        <p:cNvGrpSpPr/>
+        <p:nvPr/>
+      </p:nvGrpSpPr>
+      <p:grpSpPr>
+        <a:xfrm>
+          <a:off x="0" y="0"/>
+          <a:ext cx="0" cy="0"/>
+          <a:chOff x="0" y="0"/>
+          <a:chExt cx="0" cy="0"/>
+        </a:xfrm>
+      </p:grpSpPr>
+      <p:sp>
+        <p:nvSpPr>
+          <p:cNvPr id="2" name="כותרת 1">
+            <a:extLst>
+              <a:ext uri="{FF2B5EF4-FFF2-40B4-BE49-F238E27FC236}">
+                <a16:creationId xmlns:a16="http://schemas.microsoft.com/office/drawing/2014/main" id="{3B9BFF28-620A-4E41-912C-3BE07EE570AD}"/>
+              </a:ext>
+            </a:extLst>
+          </p:cNvPr>
+          <p:cNvSpPr>
+            <a:spLocks noGrp="1"/>
+          </p:cNvSpPr>
+          <p:nvPr>
+            <p:ph type="title"/>
+          </p:nvPr>
+        </p:nvSpPr>
+        <p:spPr>
+          <a:xfrm>
+            <a:off x="838200" y="365125"/>
+            <a:ext cx="11093388" cy="1325563"/>
+          </a:xfrm>
+        </p:spPr>
+        <p:txBody>
+          <a:bodyPr/>
+          <a:lstStyle/>
+          <a:p>
+            <a:r>
+              <a:rPr lang="he-IL" dirty="0"/>
+              <a:t>שימוש במבחן </a:t>
+            </a:r>
+            <a:r>
+              <a:rPr lang="en-US" dirty="0"/>
+              <a:t>ANOVA</a:t>
+            </a:r>
+            <a:r>
+              <a:rPr lang="he-IL" dirty="0"/>
+              <a:t> לטובת </a:t>
+            </a:r>
+            <a:r>
+              <a:rPr lang="en-US" dirty="0"/>
+              <a:t>Feature Selection</a:t>
+            </a:r>
+            <a:r>
+              <a:rPr lang="he-IL" dirty="0"/>
+              <a:t> – 3</a:t>
+            </a:r>
+          </a:p>
+        </p:txBody>
+      </p:sp>
+      <p:sp>
+        <p:nvSpPr>
+          <p:cNvPr id="3" name="מציין מיקום תוכן 2">
+            <a:extLst>
+              <a:ext uri="{FF2B5EF4-FFF2-40B4-BE49-F238E27FC236}">
+                <a16:creationId xmlns:a16="http://schemas.microsoft.com/office/drawing/2014/main" id="{38B7CD09-9088-4B59-A14D-10DD3A880F0D}"/>
+              </a:ext>
+            </a:extLst>
+          </p:cNvPr>
+          <p:cNvSpPr>
+            <a:spLocks noGrp="1"/>
+          </p:cNvSpPr>
+          <p:nvPr>
+            <p:ph idx="1"/>
+          </p:nvPr>
+        </p:nvSpPr>
+        <p:spPr>
+          <a:xfrm>
+            <a:off x="838200" y="1825625"/>
+            <a:ext cx="11093388" cy="4351338"/>
+          </a:xfrm>
+        </p:spPr>
+        <p:txBody>
+          <a:bodyPr>
+            <a:normAutofit/>
+          </a:bodyPr>
+          <a:lstStyle/>
+          <a:p>
+            <a:r>
+              <a:rPr lang="he-IL" dirty="0"/>
+              <a:t>דוגמא:</a:t>
+            </a:r>
+          </a:p>
+          <a:p>
+            <a:pPr lvl="1"/>
+            <a:r>
+              <a:rPr lang="he-IL" dirty="0"/>
+              <a:t>רוצים לבדוק השפעה בין רשומת תלמיד (גיל, אפוטרופוס, זמן לימוד, פעילויות, מספר נכשלים וכד') לבין תוצאה סופית</a:t>
+            </a:r>
+          </a:p>
+          <a:p>
+            <a:pPr lvl="1"/>
+            <a:r>
+              <a:rPr lang="en-US" dirty="0"/>
+              <a:t>Feature</a:t>
+            </a:r>
+            <a:r>
+              <a:rPr lang="he-IL" dirty="0"/>
+              <a:t> מסוג אפוטרופוס הינו קטגוריה (3 קבוצות: אבא/אמא/אחר)</a:t>
+            </a:r>
+          </a:p>
+          <a:p>
+            <a:pPr lvl="1"/>
+            <a:r>
+              <a:rPr lang="he-IL" dirty="0"/>
+              <a:t>פה תוצאה </a:t>
+            </a:r>
+            <a:r>
+              <a:rPr lang="en-US" dirty="0"/>
+              <a:t>F</a:t>
+            </a:r>
+            <a:r>
+              <a:rPr lang="he-IL" dirty="0"/>
+              <a:t> היא מעל ה </a:t>
+            </a:r>
+            <a:r>
+              <a:rPr lang="en-US" dirty="0"/>
+              <a:t>critical value</a:t>
+            </a:r>
+            <a:r>
+              <a:rPr lang="he-IL" dirty="0"/>
+              <a:t> כלומר יש שוני בין השונות </a:t>
+            </a:r>
+            <a:br>
+              <a:rPr lang="en-US" dirty="0"/>
+            </a:br>
+            <a:r>
+              <a:rPr lang="he-IL" dirty="0"/>
+              <a:t>של הקבוצות ולכן יש השפעה של </a:t>
+            </a:r>
+            <a:r>
+              <a:rPr lang="en-US" dirty="0"/>
+              <a:t>feature</a:t>
+            </a:r>
+            <a:r>
+              <a:rPr lang="he-IL" dirty="0"/>
+              <a:t> זה על הציון </a:t>
+            </a:r>
+            <a:r>
+              <a:rPr lang="en-US" dirty="0"/>
+              <a:t>(Y)</a:t>
+            </a:r>
+            <a:endParaRPr lang="he-IL" dirty="0"/>
+          </a:p>
+          <a:p>
+            <a:r>
+              <a:rPr lang="he-IL" dirty="0"/>
+              <a:t>ב </a:t>
+            </a:r>
+            <a:r>
+              <a:rPr lang="en-US" dirty="0"/>
+              <a:t>MANOVA</a:t>
+            </a:r>
+            <a:r>
+              <a:rPr lang="he-IL" dirty="0"/>
+              <a:t> בודקים האם יש השפעה של 2 משתנים על התוצאה</a:t>
+            </a:r>
+          </a:p>
+          <a:p>
+            <a:pPr lvl="1"/>
+            <a:r>
+              <a:rPr lang="he-IL" dirty="0"/>
+              <a:t>נניח אפוטרופוס ופעילויות ספורט</a:t>
+            </a:r>
+          </a:p>
+          <a:p>
+            <a:pPr lvl="1"/>
+            <a:endParaRPr lang="en-US" dirty="0"/>
+          </a:p>
+        </p:txBody>
+      </p:sp>
+      <p:pic>
+        <p:nvPicPr>
+          <p:cNvPr id="1026" name="Picture 2">
+            <a:extLst>
+              <a:ext uri="{FF2B5EF4-FFF2-40B4-BE49-F238E27FC236}">
+                <a16:creationId xmlns:a16="http://schemas.microsoft.com/office/drawing/2014/main" id="{7A7D0352-D6BB-4872-AAC2-E21655548B7B}"/>
+              </a:ext>
+            </a:extLst>
+          </p:cNvPr>
+          <p:cNvPicPr>
+            <a:picLocks noChangeAspect="1" noChangeArrowheads="1"/>
+          </p:cNvPicPr>
+          <p:nvPr/>
+        </p:nvPicPr>
+        <p:blipFill>
+          <a:blip r:embed="rId2">
+            <a:extLst>
+              <a:ext uri="{28A0092B-C50C-407E-A947-70E740481C1C}">
+                <a14:useLocalDpi xmlns:a14="http://schemas.microsoft.com/office/drawing/2010/main" val="0"/>
+              </a:ext>
+            </a:extLst>
+          </a:blip>
+          <a:srcRect/>
+          <a:stretch>
+            <a:fillRect/>
+          </a:stretch>
+        </p:blipFill>
+        <p:spPr bwMode="auto">
+          <a:xfrm>
+            <a:off x="174871" y="1485456"/>
+            <a:ext cx="1127155" cy="2515838"/>
+          </a:xfrm>
+          <a:prstGeom prst="rect">
+            <a:avLst/>
+          </a:prstGeom>
+          <a:noFill/>
+          <a:extLst>
+            <a:ext uri="{909E8E84-426E-40DD-AFC4-6F175D3DCCD1}">
+              <a14:hiddenFill xmlns:a14="http://schemas.microsoft.com/office/drawing/2010/main">
+                <a:solidFill>
+                  <a:srgbClr val="FFFFFF"/>
+                </a:solidFill>
+              </a14:hiddenFill>
+            </a:ext>
+          </a:extLst>
+        </p:spPr>
+      </p:pic>
+      <p:sp>
+        <p:nvSpPr>
+          <p:cNvPr id="4" name="AutoShape 4">
+            <a:extLst>
+              <a:ext uri="{FF2B5EF4-FFF2-40B4-BE49-F238E27FC236}">
+                <a16:creationId xmlns:a16="http://schemas.microsoft.com/office/drawing/2014/main" id="{35CA3326-071C-4257-953A-A4E064D9B03B}"/>
+              </a:ext>
+            </a:extLst>
+          </p:cNvPr>
+          <p:cNvSpPr>
+            <a:spLocks noChangeAspect="1" noChangeArrowheads="1"/>
+          </p:cNvSpPr>
+          <p:nvPr/>
+        </p:nvSpPr>
+        <p:spPr bwMode="auto">
+          <a:xfrm>
+            <a:off x="5943600" y="3276600"/>
+            <a:ext cx="304800" cy="304800"/>
+          </a:xfrm>
+          <a:prstGeom prst="rect">
+            <a:avLst/>
+          </a:prstGeom>
+          <a:noFill/>
+          <a:extLst>
+            <a:ext uri="{909E8E84-426E-40DD-AFC4-6F175D3DCCD1}">
+              <a14:hiddenFill xmlns:a14="http://schemas.microsoft.com/office/drawing/2010/main">
+                <a:solidFill>
+                  <a:srgbClr val="FFFFFF"/>
+                </a:solidFill>
+              </a14:hiddenFill>
+            </a:ext>
+          </a:extLst>
+        </p:spPr>
+        <p:txBody>
+          <a:bodyPr vert="horz" wrap="square" lIns="91440" tIns="45720" rIns="91440" bIns="45720" numCol="1" anchor="t" anchorCtr="0" compatLnSpc="1">
+            <a:prstTxWarp prst="textNoShape">
+              <a:avLst/>
+            </a:prstTxWarp>
+          </a:bodyPr>
+          <a:lstStyle/>
+          <a:p>
+            <a:endParaRPr lang="he-IL"/>
+          </a:p>
+        </p:txBody>
+      </p:sp>
+      <p:pic>
+        <p:nvPicPr>
+          <p:cNvPr id="1030" name="Picture 6">
+            <a:extLst>
+              <a:ext uri="{FF2B5EF4-FFF2-40B4-BE49-F238E27FC236}">
+                <a16:creationId xmlns:a16="http://schemas.microsoft.com/office/drawing/2014/main" id="{3F6DB447-28D8-4FC4-8650-8B8F16F6EBA1}"/>
+              </a:ext>
+            </a:extLst>
+          </p:cNvPr>
+          <p:cNvPicPr>
+            <a:picLocks noChangeAspect="1" noChangeArrowheads="1"/>
+          </p:cNvPicPr>
+          <p:nvPr/>
+        </p:nvPicPr>
+        <p:blipFill>
+          <a:blip r:embed="rId3">
+            <a:extLst>
+              <a:ext uri="{28A0092B-C50C-407E-A947-70E740481C1C}">
+                <a14:useLocalDpi xmlns:a14="http://schemas.microsoft.com/office/drawing/2010/main" val="0"/>
+              </a:ext>
+            </a:extLst>
+          </a:blip>
+          <a:srcRect/>
+          <a:stretch>
+            <a:fillRect/>
+          </a:stretch>
+        </p:blipFill>
+        <p:spPr bwMode="auto">
+          <a:xfrm>
+            <a:off x="260412" y="4219780"/>
+            <a:ext cx="2300977" cy="2466556"/>
+          </a:xfrm>
+          <a:prstGeom prst="rect">
+            <a:avLst/>
+          </a:prstGeom>
+          <a:noFill/>
+          <a:extLst>
+            <a:ext uri="{909E8E84-426E-40DD-AFC4-6F175D3DCCD1}">
+              <a14:hiddenFill xmlns:a14="http://schemas.microsoft.com/office/drawing/2010/main">
+                <a:solidFill>
+                  <a:srgbClr val="FFFFFF"/>
+                </a:solidFill>
+              </a14:hiddenFill>
+            </a:ext>
+          </a:extLst>
+        </p:spPr>
+      </p:pic>
+    </p:spTree>
+    <p:extLst>
+      <p:ext uri="{BB962C8B-B14F-4D97-AF65-F5344CB8AC3E}">
+        <p14:creationId xmlns:p14="http://schemas.microsoft.com/office/powerpoint/2010/main" val="377931046"/>
+      </p:ext>
+    </p:extLst>
+  </p:cSld>
+  <p:clrMapOvr>
+    <a:masterClrMapping/>
+  </p:clrMapOvr>
+</p:sld>
+</file>
+
+<file path=ppt/slides/slide62.xml><?xml version="1.0" encoding="utf-8"?>
+<p:sld xmlns:a="http://schemas.openxmlformats.org/drawingml/2006/main" xmlns:r="http://schemas.openxmlformats.org/officeDocument/2006/relationships" xmlns:p="http://schemas.openxmlformats.org/presentationml/2006/main">
+  <p:cSld>
+    <p:spTree>
+      <p:nvGrpSpPr>
+        <p:cNvPr id="1" name=""/>
+        <p:cNvGrpSpPr/>
+        <p:nvPr/>
+      </p:nvGrpSpPr>
+      <p:grpSpPr>
+        <a:xfrm>
+          <a:off x="0" y="0"/>
+          <a:ext cx="0" cy="0"/>
+          <a:chOff x="0" y="0"/>
+          <a:chExt cx="0" cy="0"/>
+        </a:xfrm>
+      </p:grpSpPr>
+      <p:sp>
+        <p:nvSpPr>
+          <p:cNvPr id="2" name="כותרת 1">
+            <a:extLst>
+              <a:ext uri="{FF2B5EF4-FFF2-40B4-BE49-F238E27FC236}">
+                <a16:creationId xmlns:a16="http://schemas.microsoft.com/office/drawing/2014/main" id="{007A278D-FE67-4F2B-AB85-CEA6D7E415AF}"/>
+              </a:ext>
+            </a:extLst>
+          </p:cNvPr>
+          <p:cNvSpPr>
+            <a:spLocks noGrp="1"/>
+          </p:cNvSpPr>
+          <p:nvPr>
+            <p:ph type="title"/>
+          </p:nvPr>
+        </p:nvSpPr>
+        <p:spPr/>
+        <p:txBody>
+          <a:bodyPr/>
+          <a:lstStyle/>
+          <a:p>
+            <a:endParaRPr lang="he-IL" dirty="0"/>
+          </a:p>
+        </p:txBody>
+      </p:sp>
+      <p:sp>
+        <p:nvSpPr>
+          <p:cNvPr id="3" name="מציין מיקום תוכן 2">
+            <a:extLst>
+              <a:ext uri="{FF2B5EF4-FFF2-40B4-BE49-F238E27FC236}">
+                <a16:creationId xmlns:a16="http://schemas.microsoft.com/office/drawing/2014/main" id="{6D40306E-51AD-4D44-A81A-9B06880E92BA}"/>
+              </a:ext>
+            </a:extLst>
+          </p:cNvPr>
+          <p:cNvSpPr>
+            <a:spLocks noGrp="1"/>
+          </p:cNvSpPr>
+          <p:nvPr>
+            <p:ph idx="1"/>
+          </p:nvPr>
+        </p:nvSpPr>
+        <p:spPr/>
+        <p:txBody>
+          <a:bodyPr>
+            <a:normAutofit fontScale="92500" lnSpcReduction="10000"/>
+          </a:bodyPr>
+          <a:lstStyle/>
+          <a:p>
+            <a:pPr marL="0" indent="0" algn="ctr">
+              <a:buNone/>
+            </a:pPr>
+            <a:r>
+              <a:rPr lang="en-US" sz="12000" dirty="0"/>
+              <a:t>Chi-Square TEST</a:t>
+            </a:r>
+            <a:endParaRPr lang="he-IL" sz="12000" dirty="0"/>
+          </a:p>
+          <a:p>
+            <a:pPr marL="0" indent="0" algn="ctr">
+              <a:buNone/>
+            </a:pPr>
+            <a:r>
+              <a:rPr lang="he-IL" sz="12000" dirty="0"/>
+              <a:t>ב </a:t>
+            </a:r>
+            <a:r>
+              <a:rPr lang="en-US" sz="12000" dirty="0"/>
+              <a:t>Feature Selection</a:t>
+            </a:r>
+            <a:endParaRPr lang="he-IL" sz="12000" dirty="0"/>
+          </a:p>
+        </p:txBody>
+      </p:sp>
+    </p:spTree>
+    <p:extLst>
+      <p:ext uri="{BB962C8B-B14F-4D97-AF65-F5344CB8AC3E}">
+        <p14:creationId xmlns:p14="http://schemas.microsoft.com/office/powerpoint/2010/main" val="4225430688"/>
+      </p:ext>
+    </p:extLst>
+  </p:cSld>
+  <p:clrMapOvr>
+    <a:masterClrMapping/>
+  </p:clrMapOvr>
+</p:sld>
+</file>
+
+<file path=ppt/slides/slide63.xml><?xml version="1.0" encoding="utf-8"?>
+<p:sld xmlns:a="http://schemas.openxmlformats.org/drawingml/2006/main" xmlns:r="http://schemas.openxmlformats.org/officeDocument/2006/relationships" xmlns:p="http://schemas.openxmlformats.org/presentationml/2006/main">
+  <p:cSld>
+    <p:spTree>
+      <p:nvGrpSpPr>
+        <p:cNvPr id="1" name=""/>
+        <p:cNvGrpSpPr/>
+        <p:nvPr/>
+      </p:nvGrpSpPr>
+      <p:grpSpPr>
+        <a:xfrm>
+          <a:off x="0" y="0"/>
+          <a:ext cx="0" cy="0"/>
+          <a:chOff x="0" y="0"/>
+          <a:chExt cx="0" cy="0"/>
+        </a:xfrm>
+      </p:grpSpPr>
+      <p:sp>
+        <p:nvSpPr>
+          <p:cNvPr id="2" name="כותרת 1">
+            <a:extLst>
+              <a:ext uri="{FF2B5EF4-FFF2-40B4-BE49-F238E27FC236}">
+                <a16:creationId xmlns:a16="http://schemas.microsoft.com/office/drawing/2014/main" id="{14AFE03C-302D-4EF6-9CDD-EFB42710811F}"/>
+              </a:ext>
+            </a:extLst>
+          </p:cNvPr>
+          <p:cNvSpPr>
+            <a:spLocks noGrp="1"/>
+          </p:cNvSpPr>
+          <p:nvPr>
+            <p:ph type="title"/>
+          </p:nvPr>
+        </p:nvSpPr>
+        <p:spPr/>
+        <p:txBody>
+          <a:bodyPr/>
+          <a:lstStyle/>
+          <a:p>
+            <a:endParaRPr lang="he-IL"/>
+          </a:p>
+        </p:txBody>
+      </p:sp>
+      <p:sp>
+        <p:nvSpPr>
+          <p:cNvPr id="3" name="מציין מיקום תוכן 2">
+            <a:extLst>
+              <a:ext uri="{FF2B5EF4-FFF2-40B4-BE49-F238E27FC236}">
+                <a16:creationId xmlns:a16="http://schemas.microsoft.com/office/drawing/2014/main" id="{4DFAA0A0-77B3-4B61-8377-AB01B78FEC2A}"/>
+              </a:ext>
+            </a:extLst>
+          </p:cNvPr>
+          <p:cNvSpPr>
+            <a:spLocks noGrp="1"/>
+          </p:cNvSpPr>
+          <p:nvPr>
+            <p:ph idx="1"/>
+          </p:nvPr>
+        </p:nvSpPr>
+        <p:spPr/>
+        <p:txBody>
+          <a:bodyPr/>
+          <a:lstStyle/>
+          <a:p>
+            <a:endParaRPr lang="he-IL"/>
+          </a:p>
+        </p:txBody>
+      </p:sp>
+    </p:spTree>
+    <p:extLst>
+      <p:ext uri="{BB962C8B-B14F-4D97-AF65-F5344CB8AC3E}">
+        <p14:creationId xmlns:p14="http://schemas.microsoft.com/office/powerpoint/2010/main" val="1551976138"/>
       </p:ext>
     </p:extLst>
   </p:cSld>

</xml_diff>